<commit_message>
updated presentation with comparison slide
</commit_message>
<xml_diff>
--- a/Presentation.pptx
+++ b/Presentation.pptx
@@ -15,6 +15,7 @@
     <p:sldId id="263" r:id="rId9"/>
     <p:sldId id="264" r:id="rId10"/>
     <p:sldId id="265" r:id="rId11"/>
+    <p:sldId id="266" r:id="rId12"/>
   </p:sldIdLst>
   <p:sldSz cx="12192000" cy="6858000"/>
   <p:notesSz cx="6858000" cy="9144000"/>
@@ -171,7 +172,7 @@
           <a:noFill/>
           <a:extLst>
             <a:ext uri="{909E8E84-426E-40dd-AFC4-6F175D3DCCD1}">
-              <a14:hiddenFill xmlns:a14="http://schemas.microsoft.com/office/drawing/2010/main" xmlns="">
+              <a14:hiddenFill xmlns="" xmlns:a14="http://schemas.microsoft.com/office/drawing/2010/main">
                 <a:solidFill>
                   <a:srgbClr val="FFFFFF"/>
                 </a:solidFill>
@@ -231,7 +232,7 @@
             </a:ln>
             <a:extLst>
               <a:ext uri="{91240B29-F687-4f45-9708-019B960494DF}">
-                <a14:hiddenLine xmlns:a14="http://schemas.microsoft.com/office/drawing/2010/main" xmlns="" w="9525">
+                <a14:hiddenLine xmlns="" xmlns:a14="http://schemas.microsoft.com/office/drawing/2010/main" w="9525">
                   <a:solidFill>
                     <a:srgbClr val="000000"/>
                   </a:solidFill>
@@ -321,7 +322,7 @@
             </a:ln>
             <a:extLst>
               <a:ext uri="{91240B29-F687-4f45-9708-019B960494DF}">
-                <a14:hiddenLine xmlns:a14="http://schemas.microsoft.com/office/drawing/2010/main" xmlns="" w="9525">
+                <a14:hiddenLine xmlns="" xmlns:a14="http://schemas.microsoft.com/office/drawing/2010/main" w="9525">
                   <a:solidFill>
                     <a:srgbClr val="000000"/>
                   </a:solidFill>
@@ -411,7 +412,7 @@
             </a:ln>
             <a:extLst>
               <a:ext uri="{91240B29-F687-4f45-9708-019B960494DF}">
-                <a14:hiddenLine xmlns:a14="http://schemas.microsoft.com/office/drawing/2010/main" xmlns="" w="9525">
+                <a14:hiddenLine xmlns="" xmlns:a14="http://schemas.microsoft.com/office/drawing/2010/main" w="9525">
                   <a:solidFill>
                     <a:srgbClr val="000000"/>
                   </a:solidFill>
@@ -445,7 +446,7 @@
             </a:ln>
             <a:extLst>
               <a:ext uri="{91240B29-F687-4f45-9708-019B960494DF}">
-                <a14:hiddenLine xmlns:a14="http://schemas.microsoft.com/office/drawing/2010/main" xmlns="" w="9525">
+                <a14:hiddenLine xmlns="" xmlns:a14="http://schemas.microsoft.com/office/drawing/2010/main" w="9525">
                   <a:solidFill>
                     <a:srgbClr val="000000"/>
                   </a:solidFill>
@@ -535,7 +536,7 @@
             </a:ln>
             <a:extLst>
               <a:ext uri="{91240B29-F687-4f45-9708-019B960494DF}">
-                <a14:hiddenLine xmlns:a14="http://schemas.microsoft.com/office/drawing/2010/main" xmlns="" w="9525">
+                <a14:hiddenLine xmlns="" xmlns:a14="http://schemas.microsoft.com/office/drawing/2010/main" w="9525">
                   <a:solidFill>
                     <a:srgbClr val="000000"/>
                   </a:solidFill>
@@ -597,7 +598,7 @@
             </a:ln>
             <a:extLst>
               <a:ext uri="{91240B29-F687-4f45-9708-019B960494DF}">
-                <a14:hiddenLine xmlns:a14="http://schemas.microsoft.com/office/drawing/2010/main" xmlns="" w="9525">
+                <a14:hiddenLine xmlns="" xmlns:a14="http://schemas.microsoft.com/office/drawing/2010/main" w="9525">
                   <a:solidFill>
                     <a:srgbClr val="000000"/>
                   </a:solidFill>
@@ -659,7 +660,7 @@
             </a:ln>
             <a:extLst>
               <a:ext uri="{91240B29-F687-4f45-9708-019B960494DF}">
-                <a14:hiddenLine xmlns:a14="http://schemas.microsoft.com/office/drawing/2010/main" xmlns="" w="9525">
+                <a14:hiddenLine xmlns="" xmlns:a14="http://schemas.microsoft.com/office/drawing/2010/main" w="9525">
                   <a:solidFill>
                     <a:srgbClr val="000000"/>
                   </a:solidFill>
@@ -749,7 +750,7 @@
             </a:ln>
             <a:extLst>
               <a:ext uri="{91240B29-F687-4f45-9708-019B960494DF}">
-                <a14:hiddenLine xmlns:a14="http://schemas.microsoft.com/office/drawing/2010/main" xmlns="" w="9525">
+                <a14:hiddenLine xmlns="" xmlns:a14="http://schemas.microsoft.com/office/drawing/2010/main" w="9525">
                   <a:solidFill>
                     <a:srgbClr val="000000"/>
                   </a:solidFill>
@@ -811,7 +812,7 @@
             </a:ln>
             <a:extLst>
               <a:ext uri="{91240B29-F687-4f45-9708-019B960494DF}">
-                <a14:hiddenLine xmlns:a14="http://schemas.microsoft.com/office/drawing/2010/main" xmlns="" w="9525">
+                <a14:hiddenLine xmlns="" xmlns:a14="http://schemas.microsoft.com/office/drawing/2010/main" w="9525">
                   <a:solidFill>
                     <a:srgbClr val="000000"/>
                   </a:solidFill>
@@ -873,7 +874,7 @@
             </a:ln>
             <a:extLst>
               <a:ext uri="{91240B29-F687-4f45-9708-019B960494DF}">
-                <a14:hiddenLine xmlns:a14="http://schemas.microsoft.com/office/drawing/2010/main" xmlns="" w="9525">
+                <a14:hiddenLine xmlns="" xmlns:a14="http://schemas.microsoft.com/office/drawing/2010/main" w="9525">
                   <a:solidFill>
                     <a:srgbClr val="000000"/>
                   </a:solidFill>
@@ -963,7 +964,7 @@
             </a:ln>
             <a:extLst>
               <a:ext uri="{91240B29-F687-4f45-9708-019B960494DF}">
-                <a14:hiddenLine xmlns:a14="http://schemas.microsoft.com/office/drawing/2010/main" xmlns="" w="9525">
+                <a14:hiddenLine xmlns="" xmlns:a14="http://schemas.microsoft.com/office/drawing/2010/main" w="9525">
                   <a:solidFill>
                     <a:srgbClr val="000000"/>
                   </a:solidFill>
@@ -1053,7 +1054,7 @@
             </a:ln>
             <a:extLst>
               <a:ext uri="{91240B29-F687-4f45-9708-019B960494DF}">
-                <a14:hiddenLine xmlns:a14="http://schemas.microsoft.com/office/drawing/2010/main" xmlns="" w="9525">
+                <a14:hiddenLine xmlns="" xmlns:a14="http://schemas.microsoft.com/office/drawing/2010/main" w="9525">
                   <a:solidFill>
                     <a:srgbClr val="000000"/>
                   </a:solidFill>
@@ -1115,7 +1116,7 @@
             </a:ln>
             <a:extLst>
               <a:ext uri="{91240B29-F687-4f45-9708-019B960494DF}">
-                <a14:hiddenLine xmlns:a14="http://schemas.microsoft.com/office/drawing/2010/main" xmlns="" w="9525">
+                <a14:hiddenLine xmlns="" xmlns:a14="http://schemas.microsoft.com/office/drawing/2010/main" w="9525">
                   <a:solidFill>
                     <a:srgbClr val="000000"/>
                   </a:solidFill>
@@ -1225,7 +1226,7 @@
             </a:ln>
             <a:extLst>
               <a:ext uri="{91240B29-F687-4f45-9708-019B960494DF}">
-                <a14:hiddenLine xmlns:a14="http://schemas.microsoft.com/office/drawing/2010/main" xmlns="" w="9525">
+                <a14:hiddenLine xmlns="" xmlns:a14="http://schemas.microsoft.com/office/drawing/2010/main" w="9525">
                   <a:solidFill>
                     <a:srgbClr val="000000"/>
                   </a:solidFill>
@@ -1287,7 +1288,7 @@
             </a:ln>
             <a:extLst>
               <a:ext uri="{91240B29-F687-4f45-9708-019B960494DF}">
-                <a14:hiddenLine xmlns:a14="http://schemas.microsoft.com/office/drawing/2010/main" xmlns="" w="9525">
+                <a14:hiddenLine xmlns="" xmlns:a14="http://schemas.microsoft.com/office/drawing/2010/main" w="9525">
                   <a:solidFill>
                     <a:srgbClr val="000000"/>
                   </a:solidFill>
@@ -1377,7 +1378,7 @@
             </a:ln>
             <a:extLst>
               <a:ext uri="{91240B29-F687-4f45-9708-019B960494DF}">
-                <a14:hiddenLine xmlns:a14="http://schemas.microsoft.com/office/drawing/2010/main" xmlns="" w="9525">
+                <a14:hiddenLine xmlns="" xmlns:a14="http://schemas.microsoft.com/office/drawing/2010/main" w="9525">
                   <a:solidFill>
                     <a:srgbClr val="000000"/>
                   </a:solidFill>
@@ -1467,7 +1468,7 @@
             </a:ln>
             <a:extLst>
               <a:ext uri="{91240B29-F687-4f45-9708-019B960494DF}">
-                <a14:hiddenLine xmlns:a14="http://schemas.microsoft.com/office/drawing/2010/main" xmlns="" w="9525">
+                <a14:hiddenLine xmlns="" xmlns:a14="http://schemas.microsoft.com/office/drawing/2010/main" w="9525">
                   <a:solidFill>
                     <a:srgbClr val="000000"/>
                   </a:solidFill>
@@ -1529,7 +1530,7 @@
             </a:ln>
             <a:extLst>
               <a:ext uri="{91240B29-F687-4f45-9708-019B960494DF}">
-                <a14:hiddenLine xmlns:a14="http://schemas.microsoft.com/office/drawing/2010/main" xmlns="" w="9525">
+                <a14:hiddenLine xmlns="" xmlns:a14="http://schemas.microsoft.com/office/drawing/2010/main" w="9525">
                   <a:solidFill>
                     <a:srgbClr val="000000"/>
                   </a:solidFill>
@@ -1619,7 +1620,7 @@
             </a:ln>
             <a:extLst>
               <a:ext uri="{91240B29-F687-4f45-9708-019B960494DF}">
-                <a14:hiddenLine xmlns:a14="http://schemas.microsoft.com/office/drawing/2010/main" xmlns="" w="9525">
+                <a14:hiddenLine xmlns="" xmlns:a14="http://schemas.microsoft.com/office/drawing/2010/main" w="9525">
                   <a:solidFill>
                     <a:srgbClr val="000000"/>
                   </a:solidFill>
@@ -1709,7 +1710,7 @@
             </a:ln>
             <a:extLst>
               <a:ext uri="{91240B29-F687-4f45-9708-019B960494DF}">
-                <a14:hiddenLine xmlns:a14="http://schemas.microsoft.com/office/drawing/2010/main" xmlns="" w="9525">
+                <a14:hiddenLine xmlns="" xmlns:a14="http://schemas.microsoft.com/office/drawing/2010/main" w="9525">
                   <a:solidFill>
                     <a:srgbClr val="000000"/>
                   </a:solidFill>
@@ -1765,7 +1766,7 @@
             </a:ln>
             <a:extLst>
               <a:ext uri="{91240B29-F687-4f45-9708-019B960494DF}">
-                <a14:hiddenLine xmlns:a14="http://schemas.microsoft.com/office/drawing/2010/main" xmlns="" w="9525">
+                <a14:hiddenLine xmlns="" xmlns:a14="http://schemas.microsoft.com/office/drawing/2010/main" w="9525">
                   <a:solidFill>
                     <a:srgbClr val="000000"/>
                   </a:solidFill>
@@ -1855,7 +1856,7 @@
             </a:ln>
             <a:extLst>
               <a:ext uri="{91240B29-F687-4f45-9708-019B960494DF}">
-                <a14:hiddenLine xmlns:a14="http://schemas.microsoft.com/office/drawing/2010/main" xmlns="" w="9525">
+                <a14:hiddenLine xmlns="" xmlns:a14="http://schemas.microsoft.com/office/drawing/2010/main" w="9525">
                   <a:solidFill>
                     <a:srgbClr val="000000"/>
                   </a:solidFill>
@@ -1911,7 +1912,7 @@
             </a:ln>
             <a:extLst>
               <a:ext uri="{91240B29-F687-4f45-9708-019B960494DF}">
-                <a14:hiddenLine xmlns:a14="http://schemas.microsoft.com/office/drawing/2010/main" xmlns="" w="9525">
+                <a14:hiddenLine xmlns="" xmlns:a14="http://schemas.microsoft.com/office/drawing/2010/main" w="9525">
                   <a:solidFill>
                     <a:srgbClr val="000000"/>
                   </a:solidFill>
@@ -2001,7 +2002,7 @@
             </a:ln>
             <a:extLst>
               <a:ext uri="{91240B29-F687-4f45-9708-019B960494DF}">
-                <a14:hiddenLine xmlns:a14="http://schemas.microsoft.com/office/drawing/2010/main" xmlns="" w="9525">
+                <a14:hiddenLine xmlns="" xmlns:a14="http://schemas.microsoft.com/office/drawing/2010/main" w="9525">
                   <a:solidFill>
                     <a:srgbClr val="000000"/>
                   </a:solidFill>
@@ -2069,7 +2070,7 @@
             </a:ln>
             <a:extLst>
               <a:ext uri="{91240B29-F687-4f45-9708-019B960494DF}">
-                <a14:hiddenLine xmlns:a14="http://schemas.microsoft.com/office/drawing/2010/main" xmlns="" w="9525">
+                <a14:hiddenLine xmlns="" xmlns:a14="http://schemas.microsoft.com/office/drawing/2010/main" w="9525">
                   <a:solidFill>
                     <a:srgbClr val="000000"/>
                   </a:solidFill>
@@ -2159,7 +2160,7 @@
             </a:ln>
             <a:extLst>
               <a:ext uri="{91240B29-F687-4f45-9708-019B960494DF}">
-                <a14:hiddenLine xmlns:a14="http://schemas.microsoft.com/office/drawing/2010/main" xmlns="" w="9525">
+                <a14:hiddenLine xmlns="" xmlns:a14="http://schemas.microsoft.com/office/drawing/2010/main" w="9525">
                   <a:solidFill>
                     <a:srgbClr val="000000"/>
                   </a:solidFill>
@@ -2227,7 +2228,7 @@
             </a:ln>
             <a:extLst>
               <a:ext uri="{91240B29-F687-4f45-9708-019B960494DF}">
-                <a14:hiddenLine xmlns:a14="http://schemas.microsoft.com/office/drawing/2010/main" xmlns="" w="9525">
+                <a14:hiddenLine xmlns="" xmlns:a14="http://schemas.microsoft.com/office/drawing/2010/main" w="9525">
                   <a:solidFill>
                     <a:srgbClr val="000000"/>
                   </a:solidFill>
@@ -2317,7 +2318,7 @@
             </a:ln>
             <a:extLst>
               <a:ext uri="{91240B29-F687-4f45-9708-019B960494DF}">
-                <a14:hiddenLine xmlns:a14="http://schemas.microsoft.com/office/drawing/2010/main" xmlns="" w="9525">
+                <a14:hiddenLine xmlns="" xmlns:a14="http://schemas.microsoft.com/office/drawing/2010/main" w="9525">
                   <a:solidFill>
                     <a:srgbClr val="000000"/>
                   </a:solidFill>
@@ -2351,7 +2352,7 @@
             </a:ln>
             <a:extLst>
               <a:ext uri="{91240B29-F687-4f45-9708-019B960494DF}">
-                <a14:hiddenLine xmlns:a14="http://schemas.microsoft.com/office/drawing/2010/main" xmlns="" w="9525">
+                <a14:hiddenLine xmlns="" xmlns:a14="http://schemas.microsoft.com/office/drawing/2010/main" w="9525">
                   <a:solidFill>
                     <a:srgbClr val="000000"/>
                   </a:solidFill>
@@ -2441,7 +2442,7 @@
             </a:ln>
             <a:extLst>
               <a:ext uri="{91240B29-F687-4f45-9708-019B960494DF}">
-                <a14:hiddenLine xmlns:a14="http://schemas.microsoft.com/office/drawing/2010/main" xmlns="" w="9525">
+                <a14:hiddenLine xmlns="" xmlns:a14="http://schemas.microsoft.com/office/drawing/2010/main" w="9525">
                   <a:solidFill>
                     <a:srgbClr val="000000"/>
                   </a:solidFill>
@@ -2503,7 +2504,7 @@
             </a:ln>
             <a:extLst>
               <a:ext uri="{91240B29-F687-4f45-9708-019B960494DF}">
-                <a14:hiddenLine xmlns:a14="http://schemas.microsoft.com/office/drawing/2010/main" xmlns="" w="9525">
+                <a14:hiddenLine xmlns="" xmlns:a14="http://schemas.microsoft.com/office/drawing/2010/main" w="9525">
                   <a:solidFill>
                     <a:srgbClr val="000000"/>
                   </a:solidFill>
@@ -2565,7 +2566,7 @@
             </a:ln>
             <a:extLst>
               <a:ext uri="{91240B29-F687-4f45-9708-019B960494DF}">
-                <a14:hiddenLine xmlns:a14="http://schemas.microsoft.com/office/drawing/2010/main" xmlns="" w="9525">
+                <a14:hiddenLine xmlns="" xmlns:a14="http://schemas.microsoft.com/office/drawing/2010/main" w="9525">
                   <a:solidFill>
                     <a:srgbClr val="000000"/>
                   </a:solidFill>
@@ -2655,7 +2656,7 @@
             </a:ln>
             <a:extLst>
               <a:ext uri="{91240B29-F687-4f45-9708-019B960494DF}">
-                <a14:hiddenLine xmlns:a14="http://schemas.microsoft.com/office/drawing/2010/main" xmlns="" w="9525">
+                <a14:hiddenLine xmlns="" xmlns:a14="http://schemas.microsoft.com/office/drawing/2010/main" w="9525">
                   <a:solidFill>
                     <a:srgbClr val="000000"/>
                   </a:solidFill>
@@ -2723,7 +2724,7 @@
             </a:ln>
             <a:extLst>
               <a:ext uri="{91240B29-F687-4f45-9708-019B960494DF}">
-                <a14:hiddenLine xmlns:a14="http://schemas.microsoft.com/office/drawing/2010/main" xmlns="" w="9525">
+                <a14:hiddenLine xmlns="" xmlns:a14="http://schemas.microsoft.com/office/drawing/2010/main" w="9525">
                   <a:solidFill>
                     <a:srgbClr val="000000"/>
                   </a:solidFill>
@@ -2785,7 +2786,7 @@
             </a:ln>
             <a:extLst>
               <a:ext uri="{91240B29-F687-4f45-9708-019B960494DF}">
-                <a14:hiddenLine xmlns:a14="http://schemas.microsoft.com/office/drawing/2010/main" xmlns="" w="9525">
+                <a14:hiddenLine xmlns="" xmlns:a14="http://schemas.microsoft.com/office/drawing/2010/main" w="9525">
                   <a:solidFill>
                     <a:srgbClr val="000000"/>
                   </a:solidFill>
@@ -2875,7 +2876,7 @@
             </a:ln>
             <a:extLst>
               <a:ext uri="{91240B29-F687-4f45-9708-019B960494DF}">
-                <a14:hiddenLine xmlns:a14="http://schemas.microsoft.com/office/drawing/2010/main" xmlns="" w="9525">
+                <a14:hiddenLine xmlns="" xmlns:a14="http://schemas.microsoft.com/office/drawing/2010/main" w="9525">
                   <a:solidFill>
                     <a:srgbClr val="000000"/>
                   </a:solidFill>
@@ -2937,7 +2938,7 @@
             </a:ln>
             <a:extLst>
               <a:ext uri="{91240B29-F687-4f45-9708-019B960494DF}">
-                <a14:hiddenLine xmlns:a14="http://schemas.microsoft.com/office/drawing/2010/main" xmlns="" w="9525">
+                <a14:hiddenLine xmlns="" xmlns:a14="http://schemas.microsoft.com/office/drawing/2010/main" w="9525">
                   <a:solidFill>
                     <a:srgbClr val="000000"/>
                   </a:solidFill>
@@ -3027,7 +3028,7 @@
             </a:ln>
             <a:extLst>
               <a:ext uri="{91240B29-F687-4f45-9708-019B960494DF}">
-                <a14:hiddenLine xmlns:a14="http://schemas.microsoft.com/office/drawing/2010/main" xmlns="" w="9525">
+                <a14:hiddenLine xmlns="" xmlns:a14="http://schemas.microsoft.com/office/drawing/2010/main" w="9525">
                   <a:solidFill>
                     <a:srgbClr val="000000"/>
                   </a:solidFill>
@@ -3089,7 +3090,7 @@
             </a:ln>
             <a:extLst>
               <a:ext uri="{91240B29-F687-4f45-9708-019B960494DF}">
-                <a14:hiddenLine xmlns:a14="http://schemas.microsoft.com/office/drawing/2010/main" xmlns="" w="9525">
+                <a14:hiddenLine xmlns="" xmlns:a14="http://schemas.microsoft.com/office/drawing/2010/main" w="9525">
                   <a:solidFill>
                     <a:srgbClr val="000000"/>
                   </a:solidFill>
@@ -3179,7 +3180,7 @@
             </a:ln>
             <a:extLst>
               <a:ext uri="{91240B29-F687-4f45-9708-019B960494DF}">
-                <a14:hiddenLine xmlns:a14="http://schemas.microsoft.com/office/drawing/2010/main" xmlns="" w="9525">
+                <a14:hiddenLine xmlns="" xmlns:a14="http://schemas.microsoft.com/office/drawing/2010/main" w="9525">
                   <a:solidFill>
                     <a:srgbClr val="000000"/>
                   </a:solidFill>
@@ -3213,7 +3214,7 @@
             </a:ln>
             <a:extLst>
               <a:ext uri="{91240B29-F687-4f45-9708-019B960494DF}">
-                <a14:hiddenLine xmlns:a14="http://schemas.microsoft.com/office/drawing/2010/main" xmlns="" w="9525">
+                <a14:hiddenLine xmlns="" xmlns:a14="http://schemas.microsoft.com/office/drawing/2010/main" w="9525">
                   <a:solidFill>
                     <a:srgbClr val="000000"/>
                   </a:solidFill>
@@ -3278,7 +3279,7 @@
             </a:ln>
             <a:extLst>
               <a:ext uri="{91240B29-F687-4f45-9708-019B960494DF}">
-                <a14:hiddenLine xmlns:a14="http://schemas.microsoft.com/office/drawing/2010/main" xmlns="" w="9525">
+                <a14:hiddenLine xmlns="" xmlns:a14="http://schemas.microsoft.com/office/drawing/2010/main" w="9525">
                   <a:solidFill>
                     <a:srgbClr val="000000"/>
                   </a:solidFill>
@@ -3368,7 +3369,7 @@
             </a:ln>
             <a:extLst>
               <a:ext uri="{91240B29-F687-4f45-9708-019B960494DF}">
-                <a14:hiddenLine xmlns:a14="http://schemas.microsoft.com/office/drawing/2010/main" xmlns="" w="9525">
+                <a14:hiddenLine xmlns="" xmlns:a14="http://schemas.microsoft.com/office/drawing/2010/main" w="9525">
                   <a:solidFill>
                     <a:srgbClr val="000000"/>
                   </a:solidFill>
@@ -3430,7 +3431,7 @@
             </a:ln>
             <a:extLst>
               <a:ext uri="{91240B29-F687-4f45-9708-019B960494DF}">
-                <a14:hiddenLine xmlns:a14="http://schemas.microsoft.com/office/drawing/2010/main" xmlns="" w="9525">
+                <a14:hiddenLine xmlns="" xmlns:a14="http://schemas.microsoft.com/office/drawing/2010/main" w="9525">
                   <a:solidFill>
                     <a:srgbClr val="000000"/>
                   </a:solidFill>
@@ -3520,7 +3521,7 @@
             </a:ln>
             <a:extLst>
               <a:ext uri="{91240B29-F687-4f45-9708-019B960494DF}">
-                <a14:hiddenLine xmlns:a14="http://schemas.microsoft.com/office/drawing/2010/main" xmlns="" w="9525">
+                <a14:hiddenLine xmlns="" xmlns:a14="http://schemas.microsoft.com/office/drawing/2010/main" w="9525">
                   <a:solidFill>
                     <a:srgbClr val="000000"/>
                   </a:solidFill>
@@ -3610,7 +3611,7 @@
             </a:ln>
             <a:extLst>
               <a:ext uri="{91240B29-F687-4f45-9708-019B960494DF}">
-                <a14:hiddenLine xmlns:a14="http://schemas.microsoft.com/office/drawing/2010/main" xmlns="" w="9525">
+                <a14:hiddenLine xmlns="" xmlns:a14="http://schemas.microsoft.com/office/drawing/2010/main" w="9525">
                   <a:solidFill>
                     <a:srgbClr val="000000"/>
                   </a:solidFill>
@@ -3675,7 +3676,7 @@
             </a:ln>
             <a:extLst>
               <a:ext uri="{91240B29-F687-4f45-9708-019B960494DF}">
-                <a14:hiddenLine xmlns:a14="http://schemas.microsoft.com/office/drawing/2010/main" xmlns="" w="9525">
+                <a14:hiddenLine xmlns="" xmlns:a14="http://schemas.microsoft.com/office/drawing/2010/main" w="9525">
                   <a:solidFill>
                     <a:srgbClr val="000000"/>
                   </a:solidFill>
@@ -3737,7 +3738,7 @@
             </a:ln>
             <a:extLst>
               <a:ext uri="{91240B29-F687-4f45-9708-019B960494DF}">
-                <a14:hiddenLine xmlns:a14="http://schemas.microsoft.com/office/drawing/2010/main" xmlns="" w="9525">
+                <a14:hiddenLine xmlns="" xmlns:a14="http://schemas.microsoft.com/office/drawing/2010/main" w="9525">
                   <a:solidFill>
                     <a:srgbClr val="000000"/>
                   </a:solidFill>
@@ -3827,7 +3828,7 @@
             </a:ln>
             <a:extLst>
               <a:ext uri="{91240B29-F687-4f45-9708-019B960494DF}">
-                <a14:hiddenLine xmlns:a14="http://schemas.microsoft.com/office/drawing/2010/main" xmlns="" w="9525">
+                <a14:hiddenLine xmlns="" xmlns:a14="http://schemas.microsoft.com/office/drawing/2010/main" w="9525">
                   <a:solidFill>
                     <a:srgbClr val="000000"/>
                   </a:solidFill>
@@ -3917,7 +3918,7 @@
             </a:ln>
             <a:extLst>
               <a:ext uri="{91240B29-F687-4f45-9708-019B960494DF}">
-                <a14:hiddenLine xmlns:a14="http://schemas.microsoft.com/office/drawing/2010/main" xmlns="" w="9525">
+                <a14:hiddenLine xmlns="" xmlns:a14="http://schemas.microsoft.com/office/drawing/2010/main" w="9525">
                   <a:solidFill>
                     <a:srgbClr val="000000"/>
                   </a:solidFill>
@@ -3979,7 +3980,7 @@
             </a:ln>
             <a:extLst>
               <a:ext uri="{91240B29-F687-4f45-9708-019B960494DF}">
-                <a14:hiddenLine xmlns:a14="http://schemas.microsoft.com/office/drawing/2010/main" xmlns="" w="9525">
+                <a14:hiddenLine xmlns="" xmlns:a14="http://schemas.microsoft.com/office/drawing/2010/main" w="9525">
                   <a:solidFill>
                     <a:srgbClr val="000000"/>
                   </a:solidFill>
@@ -4099,7 +4100,7 @@
             </a:ln>
             <a:extLst>
               <a:ext uri="{91240B29-F687-4f45-9708-019B960494DF}">
-                <a14:hiddenLine xmlns:a14="http://schemas.microsoft.com/office/drawing/2010/main" xmlns="" w="9525">
+                <a14:hiddenLine xmlns="" xmlns:a14="http://schemas.microsoft.com/office/drawing/2010/main" w="9525">
                   <a:solidFill>
                     <a:srgbClr val="000000"/>
                   </a:solidFill>
@@ -4167,7 +4168,7 @@
             </a:ln>
             <a:extLst>
               <a:ext uri="{91240B29-F687-4f45-9708-019B960494DF}">
-                <a14:hiddenLine xmlns:a14="http://schemas.microsoft.com/office/drawing/2010/main" xmlns="" w="9525">
+                <a14:hiddenLine xmlns="" xmlns:a14="http://schemas.microsoft.com/office/drawing/2010/main" w="9525">
                   <a:solidFill>
                     <a:srgbClr val="000000"/>
                   </a:solidFill>
@@ -4257,7 +4258,7 @@
             </a:ln>
             <a:extLst>
               <a:ext uri="{91240B29-F687-4f45-9708-019B960494DF}">
-                <a14:hiddenLine xmlns:a14="http://schemas.microsoft.com/office/drawing/2010/main" xmlns="" w="9525">
+                <a14:hiddenLine xmlns="" xmlns:a14="http://schemas.microsoft.com/office/drawing/2010/main" w="9525">
                   <a:solidFill>
                     <a:srgbClr val="000000"/>
                   </a:solidFill>
@@ -4397,7 +4398,7 @@
           <a:p>
             <a:fld id="{968E067E-08D9-EE45-AE85-B5EB2135B1EF}" type="datetimeFigureOut">
               <a:rPr lang="en-US" smtClean="0"/>
-              <a:t>7/13/2018</a:t>
+              <a:t>7/14/2018</a:t>
             </a:fld>
             <a:endParaRPr lang="en-US"/>
           </a:p>
@@ -4664,7 +4665,7 @@
           <a:p>
             <a:fld id="{968E067E-08D9-EE45-AE85-B5EB2135B1EF}" type="datetimeFigureOut">
               <a:rPr lang="en-US" smtClean="0"/>
-              <a:t>7/13/2018</a:t>
+              <a:t>7/14/2018</a:t>
             </a:fld>
             <a:endParaRPr lang="en-US"/>
           </a:p>
@@ -4860,7 +4861,7 @@
           <a:p>
             <a:fld id="{968E067E-08D9-EE45-AE85-B5EB2135B1EF}" type="datetimeFigureOut">
               <a:rPr lang="en-US" smtClean="0"/>
-              <a:t>7/13/2018</a:t>
+              <a:t>7/14/2018</a:t>
             </a:fld>
             <a:endParaRPr lang="en-US"/>
           </a:p>
@@ -5123,7 +5124,7 @@
           <a:p>
             <a:fld id="{968E067E-08D9-EE45-AE85-B5EB2135B1EF}" type="datetimeFigureOut">
               <a:rPr lang="en-US" smtClean="0"/>
-              <a:t>7/13/2018</a:t>
+              <a:t>7/14/2018</a:t>
             </a:fld>
             <a:endParaRPr lang="en-US"/>
           </a:p>
@@ -5557,7 +5558,7 @@
           <a:p>
             <a:fld id="{968E067E-08D9-EE45-AE85-B5EB2135B1EF}" type="datetimeFigureOut">
               <a:rPr lang="en-US" smtClean="0"/>
-              <a:t>7/13/2018</a:t>
+              <a:t>7/14/2018</a:t>
             </a:fld>
             <a:endParaRPr lang="en-US"/>
           </a:p>
@@ -6103,7 +6104,7 @@
           <a:p>
             <a:fld id="{968E067E-08D9-EE45-AE85-B5EB2135B1EF}" type="datetimeFigureOut">
               <a:rPr lang="en-US" smtClean="0"/>
-              <a:t>7/13/2018</a:t>
+              <a:t>7/14/2018</a:t>
             </a:fld>
             <a:endParaRPr lang="en-US"/>
           </a:p>
@@ -6823,7 +6824,7 @@
           <a:p>
             <a:fld id="{968E067E-08D9-EE45-AE85-B5EB2135B1EF}" type="datetimeFigureOut">
               <a:rPr lang="en-US" smtClean="0"/>
-              <a:t>7/13/2018</a:t>
+              <a:t>7/14/2018</a:t>
             </a:fld>
             <a:endParaRPr lang="en-US"/>
           </a:p>
@@ -6993,7 +6994,7 @@
           <a:p>
             <a:fld id="{968E067E-08D9-EE45-AE85-B5EB2135B1EF}" type="datetimeFigureOut">
               <a:rPr lang="en-US" smtClean="0"/>
-              <a:t>7/13/2018</a:t>
+              <a:t>7/14/2018</a:t>
             </a:fld>
             <a:endParaRPr lang="en-US"/>
           </a:p>
@@ -7173,7 +7174,7 @@
           <a:p>
             <a:fld id="{968E067E-08D9-EE45-AE85-B5EB2135B1EF}" type="datetimeFigureOut">
               <a:rPr lang="en-US" smtClean="0"/>
-              <a:t>7/13/2018</a:t>
+              <a:t>7/14/2018</a:t>
             </a:fld>
             <a:endParaRPr lang="en-US"/>
           </a:p>
@@ -7343,7 +7344,7 @@
           <a:p>
             <a:fld id="{968E067E-08D9-EE45-AE85-B5EB2135B1EF}" type="datetimeFigureOut">
               <a:rPr lang="en-US" smtClean="0"/>
-              <a:t>7/13/2018</a:t>
+              <a:t>7/14/2018</a:t>
             </a:fld>
             <a:endParaRPr lang="en-US"/>
           </a:p>
@@ -7593,7 +7594,7 @@
           <a:p>
             <a:fld id="{968E067E-08D9-EE45-AE85-B5EB2135B1EF}" type="datetimeFigureOut">
               <a:rPr lang="en-US" smtClean="0"/>
-              <a:t>7/13/2018</a:t>
+              <a:t>7/14/2018</a:t>
             </a:fld>
             <a:endParaRPr lang="en-US"/>
           </a:p>
@@ -7825,7 +7826,7 @@
           <a:p>
             <a:fld id="{968E067E-08D9-EE45-AE85-B5EB2135B1EF}" type="datetimeFigureOut">
               <a:rPr lang="en-US" smtClean="0"/>
-              <a:t>7/13/2018</a:t>
+              <a:t>7/14/2018</a:t>
             </a:fld>
             <a:endParaRPr lang="en-US"/>
           </a:p>
@@ -8206,7 +8207,7 @@
           <a:p>
             <a:fld id="{968E067E-08D9-EE45-AE85-B5EB2135B1EF}" type="datetimeFigureOut">
               <a:rPr lang="en-US" smtClean="0"/>
-              <a:t>7/13/2018</a:t>
+              <a:t>7/14/2018</a:t>
             </a:fld>
             <a:endParaRPr lang="en-US"/>
           </a:p>
@@ -8324,7 +8325,7 @@
           <a:p>
             <a:fld id="{968E067E-08D9-EE45-AE85-B5EB2135B1EF}" type="datetimeFigureOut">
               <a:rPr lang="en-US" smtClean="0"/>
-              <a:t>7/13/2018</a:t>
+              <a:t>7/14/2018</a:t>
             </a:fld>
             <a:endParaRPr lang="en-US"/>
           </a:p>
@@ -8419,7 +8420,7 @@
           <a:p>
             <a:fld id="{968E067E-08D9-EE45-AE85-B5EB2135B1EF}" type="datetimeFigureOut">
               <a:rPr lang="en-US" smtClean="0"/>
-              <a:t>7/13/2018</a:t>
+              <a:t>7/14/2018</a:t>
             </a:fld>
             <a:endParaRPr lang="en-US"/>
           </a:p>
@@ -8668,7 +8669,7 @@
           <a:p>
             <a:fld id="{968E067E-08D9-EE45-AE85-B5EB2135B1EF}" type="datetimeFigureOut">
               <a:rPr lang="en-US" smtClean="0"/>
-              <a:t>7/13/2018</a:t>
+              <a:t>7/14/2018</a:t>
             </a:fld>
             <a:endParaRPr lang="en-US"/>
           </a:p>
@@ -8948,7 +8949,7 @@
           <a:p>
             <a:fld id="{968E067E-08D9-EE45-AE85-B5EB2135B1EF}" type="datetimeFigureOut">
               <a:rPr lang="en-US" smtClean="0"/>
-              <a:t>7/13/2018</a:t>
+              <a:t>7/14/2018</a:t>
             </a:fld>
             <a:endParaRPr lang="en-US"/>
           </a:p>
@@ -9064,7 +9065,7 @@
           <a:noFill/>
           <a:extLst>
             <a:ext uri="{909E8E84-426E-40dd-AFC4-6F175D3DCCD1}">
-              <a14:hiddenFill xmlns:a14="http://schemas.microsoft.com/office/drawing/2010/main" xmlns="">
+              <a14:hiddenFill xmlns="" xmlns:a14="http://schemas.microsoft.com/office/drawing/2010/main">
                 <a:solidFill>
                   <a:srgbClr val="FFFFFF"/>
                 </a:solidFill>
@@ -9138,7 +9139,7 @@
               </a:ln>
               <a:extLst>
                 <a:ext uri="{91240B29-F687-4f45-9708-019B960494DF}">
-                  <a14:hiddenLine xmlns:a14="http://schemas.microsoft.com/office/drawing/2010/main" xmlns="" w="9525">
+                  <a14:hiddenLine xmlns="" xmlns:a14="http://schemas.microsoft.com/office/drawing/2010/main" w="9525">
                     <a:solidFill>
                       <a:srgbClr val="000000"/>
                     </a:solidFill>
@@ -9228,7 +9229,7 @@
               </a:ln>
               <a:extLst>
                 <a:ext uri="{91240B29-F687-4f45-9708-019B960494DF}">
-                  <a14:hiddenLine xmlns:a14="http://schemas.microsoft.com/office/drawing/2010/main" xmlns="" w="9525">
+                  <a14:hiddenLine xmlns="" xmlns:a14="http://schemas.microsoft.com/office/drawing/2010/main" w="9525">
                     <a:solidFill>
                       <a:srgbClr val="000000"/>
                     </a:solidFill>
@@ -9318,7 +9319,7 @@
               </a:ln>
               <a:extLst>
                 <a:ext uri="{91240B29-F687-4f45-9708-019B960494DF}">
-                  <a14:hiddenLine xmlns:a14="http://schemas.microsoft.com/office/drawing/2010/main" xmlns="" w="9525">
+                  <a14:hiddenLine xmlns="" xmlns:a14="http://schemas.microsoft.com/office/drawing/2010/main" w="9525">
                     <a:solidFill>
                       <a:srgbClr val="000000"/>
                     </a:solidFill>
@@ -9380,7 +9381,7 @@
               </a:ln>
               <a:extLst>
                 <a:ext uri="{91240B29-F687-4f45-9708-019B960494DF}">
-                  <a14:hiddenLine xmlns:a14="http://schemas.microsoft.com/office/drawing/2010/main" xmlns="" w="9525">
+                  <a14:hiddenLine xmlns="" xmlns:a14="http://schemas.microsoft.com/office/drawing/2010/main" w="9525">
                     <a:solidFill>
                       <a:srgbClr val="000000"/>
                     </a:solidFill>
@@ -9470,7 +9471,7 @@
               </a:ln>
               <a:extLst>
                 <a:ext uri="{91240B29-F687-4f45-9708-019B960494DF}">
-                  <a14:hiddenLine xmlns:a14="http://schemas.microsoft.com/office/drawing/2010/main" xmlns="" w="9525">
+                  <a14:hiddenLine xmlns="" xmlns:a14="http://schemas.microsoft.com/office/drawing/2010/main" w="9525">
                     <a:solidFill>
                       <a:srgbClr val="000000"/>
                     </a:solidFill>
@@ -9532,7 +9533,7 @@
               </a:ln>
               <a:extLst>
                 <a:ext uri="{91240B29-F687-4f45-9708-019B960494DF}">
-                  <a14:hiddenLine xmlns:a14="http://schemas.microsoft.com/office/drawing/2010/main" xmlns="" w="9525">
+                  <a14:hiddenLine xmlns="" xmlns:a14="http://schemas.microsoft.com/office/drawing/2010/main" w="9525">
                     <a:solidFill>
                       <a:srgbClr val="000000"/>
                     </a:solidFill>
@@ -9594,7 +9595,7 @@
               </a:ln>
               <a:extLst>
                 <a:ext uri="{91240B29-F687-4f45-9708-019B960494DF}">
-                  <a14:hiddenLine xmlns:a14="http://schemas.microsoft.com/office/drawing/2010/main" xmlns="" w="9525">
+                  <a14:hiddenLine xmlns="" xmlns:a14="http://schemas.microsoft.com/office/drawing/2010/main" w="9525">
                     <a:solidFill>
                       <a:srgbClr val="000000"/>
                     </a:solidFill>
@@ -9684,7 +9685,7 @@
               </a:ln>
               <a:extLst>
                 <a:ext uri="{91240B29-F687-4f45-9708-019B960494DF}">
-                  <a14:hiddenLine xmlns:a14="http://schemas.microsoft.com/office/drawing/2010/main" xmlns="" w="9525">
+                  <a14:hiddenLine xmlns="" xmlns:a14="http://schemas.microsoft.com/office/drawing/2010/main" w="9525">
                     <a:solidFill>
                       <a:srgbClr val="000000"/>
                     </a:solidFill>
@@ -9774,7 +9775,7 @@
               </a:ln>
               <a:extLst>
                 <a:ext uri="{91240B29-F687-4f45-9708-019B960494DF}">
-                  <a14:hiddenLine xmlns:a14="http://schemas.microsoft.com/office/drawing/2010/main" xmlns="" w="9525">
+                  <a14:hiddenLine xmlns="" xmlns:a14="http://schemas.microsoft.com/office/drawing/2010/main" w="9525">
                     <a:solidFill>
                       <a:srgbClr val="000000"/>
                     </a:solidFill>
@@ -9836,7 +9837,7 @@
               </a:ln>
               <a:extLst>
                 <a:ext uri="{91240B29-F687-4f45-9708-019B960494DF}">
-                  <a14:hiddenLine xmlns:a14="http://schemas.microsoft.com/office/drawing/2010/main" xmlns="" w="9525">
+                  <a14:hiddenLine xmlns="" xmlns:a14="http://schemas.microsoft.com/office/drawing/2010/main" w="9525">
                     <a:solidFill>
                       <a:srgbClr val="000000"/>
                     </a:solidFill>
@@ -9946,7 +9947,7 @@
               </a:ln>
               <a:extLst>
                 <a:ext uri="{91240B29-F687-4f45-9708-019B960494DF}">
-                  <a14:hiddenLine xmlns:a14="http://schemas.microsoft.com/office/drawing/2010/main" xmlns="" w="9525">
+                  <a14:hiddenLine xmlns="" xmlns:a14="http://schemas.microsoft.com/office/drawing/2010/main" w="9525">
                     <a:solidFill>
                       <a:srgbClr val="000000"/>
                     </a:solidFill>
@@ -10030,7 +10031,7 @@
               </a:ln>
               <a:extLst>
                 <a:ext uri="{91240B29-F687-4f45-9708-019B960494DF}">
-                  <a14:hiddenLine xmlns:a14="http://schemas.microsoft.com/office/drawing/2010/main" xmlns="" w="9525">
+                  <a14:hiddenLine xmlns="" xmlns:a14="http://schemas.microsoft.com/office/drawing/2010/main" w="9525">
                     <a:solidFill>
                       <a:srgbClr val="000000"/>
                     </a:solidFill>
@@ -10092,7 +10093,7 @@
               </a:ln>
               <a:extLst>
                 <a:ext uri="{91240B29-F687-4f45-9708-019B960494DF}">
-                  <a14:hiddenLine xmlns:a14="http://schemas.microsoft.com/office/drawing/2010/main" xmlns="" w="9525">
+                  <a14:hiddenLine xmlns="" xmlns:a14="http://schemas.microsoft.com/office/drawing/2010/main" w="9525">
                     <a:solidFill>
                       <a:srgbClr val="000000"/>
                     </a:solidFill>
@@ -10154,7 +10155,7 @@
               </a:ln>
               <a:extLst>
                 <a:ext uri="{91240B29-F687-4f45-9708-019B960494DF}">
-                  <a14:hiddenLine xmlns:a14="http://schemas.microsoft.com/office/drawing/2010/main" xmlns="" w="9525">
+                  <a14:hiddenLine xmlns="" xmlns:a14="http://schemas.microsoft.com/office/drawing/2010/main" w="9525">
                     <a:solidFill>
                       <a:srgbClr val="000000"/>
                     </a:solidFill>
@@ -10244,7 +10245,7 @@
               </a:ln>
               <a:extLst>
                 <a:ext uri="{91240B29-F687-4f45-9708-019B960494DF}">
-                  <a14:hiddenLine xmlns:a14="http://schemas.microsoft.com/office/drawing/2010/main" xmlns="" w="9525">
+                  <a14:hiddenLine xmlns="" xmlns:a14="http://schemas.microsoft.com/office/drawing/2010/main" w="9525">
                     <a:solidFill>
                       <a:srgbClr val="000000"/>
                     </a:solidFill>
@@ -10278,7 +10279,7 @@
               </a:ln>
               <a:extLst>
                 <a:ext uri="{91240B29-F687-4f45-9708-019B960494DF}">
-                  <a14:hiddenLine xmlns:a14="http://schemas.microsoft.com/office/drawing/2010/main" xmlns="" w="9525">
+                  <a14:hiddenLine xmlns="" xmlns:a14="http://schemas.microsoft.com/office/drawing/2010/main" w="9525">
                     <a:solidFill>
                       <a:srgbClr val="000000"/>
                     </a:solidFill>
@@ -10343,7 +10344,7 @@
               </a:ln>
               <a:extLst>
                 <a:ext uri="{91240B29-F687-4f45-9708-019B960494DF}">
-                  <a14:hiddenLine xmlns:a14="http://schemas.microsoft.com/office/drawing/2010/main" xmlns="" w="9525">
+                  <a14:hiddenLine xmlns="" xmlns:a14="http://schemas.microsoft.com/office/drawing/2010/main" w="9525">
                     <a:solidFill>
                       <a:srgbClr val="000000"/>
                     </a:solidFill>
@@ -10433,7 +10434,7 @@
               </a:ln>
               <a:extLst>
                 <a:ext uri="{91240B29-F687-4f45-9708-019B960494DF}">
-                  <a14:hiddenLine xmlns:a14="http://schemas.microsoft.com/office/drawing/2010/main" xmlns="" w="9525">
+                  <a14:hiddenLine xmlns="" xmlns:a14="http://schemas.microsoft.com/office/drawing/2010/main" w="9525">
                     <a:solidFill>
                       <a:srgbClr val="000000"/>
                     </a:solidFill>
@@ -10495,7 +10496,7 @@
               </a:ln>
               <a:extLst>
                 <a:ext uri="{91240B29-F687-4f45-9708-019B960494DF}">
-                  <a14:hiddenLine xmlns:a14="http://schemas.microsoft.com/office/drawing/2010/main" xmlns="" w="9525">
+                  <a14:hiddenLine xmlns="" xmlns:a14="http://schemas.microsoft.com/office/drawing/2010/main" w="9525">
                     <a:solidFill>
                       <a:srgbClr val="000000"/>
                     </a:solidFill>
@@ -10585,7 +10586,7 @@
               </a:ln>
               <a:extLst>
                 <a:ext uri="{91240B29-F687-4f45-9708-019B960494DF}">
-                  <a14:hiddenLine xmlns:a14="http://schemas.microsoft.com/office/drawing/2010/main" xmlns="" w="9525">
+                  <a14:hiddenLine xmlns="" xmlns:a14="http://schemas.microsoft.com/office/drawing/2010/main" w="9525">
                     <a:solidFill>
                       <a:srgbClr val="000000"/>
                     </a:solidFill>
@@ -10650,7 +10651,7 @@
               </a:ln>
               <a:extLst>
                 <a:ext uri="{91240B29-F687-4f45-9708-019B960494DF}">
-                  <a14:hiddenLine xmlns:a14="http://schemas.microsoft.com/office/drawing/2010/main" xmlns="" w="9525">
+                  <a14:hiddenLine xmlns="" xmlns:a14="http://schemas.microsoft.com/office/drawing/2010/main" w="9525">
                     <a:solidFill>
                       <a:srgbClr val="000000"/>
                     </a:solidFill>
@@ -10712,7 +10713,7 @@
               </a:ln>
               <a:extLst>
                 <a:ext uri="{91240B29-F687-4f45-9708-019B960494DF}">
-                  <a14:hiddenLine xmlns:a14="http://schemas.microsoft.com/office/drawing/2010/main" xmlns="" w="9525">
+                  <a14:hiddenLine xmlns="" xmlns:a14="http://schemas.microsoft.com/office/drawing/2010/main" w="9525">
                     <a:solidFill>
                       <a:srgbClr val="000000"/>
                     </a:solidFill>
@@ -10802,7 +10803,7 @@
               </a:ln>
               <a:extLst>
                 <a:ext uri="{91240B29-F687-4f45-9708-019B960494DF}">
-                  <a14:hiddenLine xmlns:a14="http://schemas.microsoft.com/office/drawing/2010/main" xmlns="" w="9525">
+                  <a14:hiddenLine xmlns="" xmlns:a14="http://schemas.microsoft.com/office/drawing/2010/main" w="9525">
                     <a:solidFill>
                       <a:srgbClr val="000000"/>
                     </a:solidFill>
@@ -10892,7 +10893,7 @@
               </a:ln>
               <a:extLst>
                 <a:ext uri="{91240B29-F687-4f45-9708-019B960494DF}">
-                  <a14:hiddenLine xmlns:a14="http://schemas.microsoft.com/office/drawing/2010/main" xmlns="" w="9525">
+                  <a14:hiddenLine xmlns="" xmlns:a14="http://schemas.microsoft.com/office/drawing/2010/main" w="9525">
                     <a:solidFill>
                       <a:srgbClr val="000000"/>
                     </a:solidFill>
@@ -10957,7 +10958,7 @@
               </a:ln>
               <a:extLst>
                 <a:ext uri="{91240B29-F687-4f45-9708-019B960494DF}">
-                  <a14:hiddenLine xmlns:a14="http://schemas.microsoft.com/office/drawing/2010/main" xmlns="" w="9525">
+                  <a14:hiddenLine xmlns="" xmlns:a14="http://schemas.microsoft.com/office/drawing/2010/main" w="9525">
                     <a:solidFill>
                       <a:srgbClr val="000000"/>
                     </a:solidFill>
@@ -11077,7 +11078,7 @@
               </a:ln>
               <a:extLst>
                 <a:ext uri="{91240B29-F687-4f45-9708-019B960494DF}">
-                  <a14:hiddenLine xmlns:a14="http://schemas.microsoft.com/office/drawing/2010/main" xmlns="" w="9525">
+                  <a14:hiddenLine xmlns="" xmlns:a14="http://schemas.microsoft.com/office/drawing/2010/main" w="9525">
                     <a:solidFill>
                       <a:srgbClr val="000000"/>
                     </a:solidFill>
@@ -11175,7 +11176,7 @@
               </a:ln>
               <a:extLst>
                 <a:ext uri="{91240B29-F687-4f45-9708-019B960494DF}">
-                  <a14:hiddenLine xmlns:a14="http://schemas.microsoft.com/office/drawing/2010/main" xmlns="" w="9525">
+                  <a14:hiddenLine xmlns="" xmlns:a14="http://schemas.microsoft.com/office/drawing/2010/main" w="9525">
                     <a:solidFill>
                       <a:srgbClr val="000000"/>
                     </a:solidFill>
@@ -11290,7 +11291,7 @@
               </a:ln>
               <a:extLst>
                 <a:ext uri="{91240B29-F687-4f45-9708-019B960494DF}">
-                  <a14:hiddenLine xmlns:a14="http://schemas.microsoft.com/office/drawing/2010/main" xmlns="" w="9525">
+                  <a14:hiddenLine xmlns="" xmlns:a14="http://schemas.microsoft.com/office/drawing/2010/main" w="9525">
                     <a:solidFill>
                       <a:srgbClr val="000000"/>
                     </a:solidFill>
@@ -11380,7 +11381,7 @@
               </a:ln>
               <a:extLst>
                 <a:ext uri="{91240B29-F687-4f45-9708-019B960494DF}">
-                  <a14:hiddenLine xmlns:a14="http://schemas.microsoft.com/office/drawing/2010/main" xmlns="" w="9525">
+                  <a14:hiddenLine xmlns="" xmlns:a14="http://schemas.microsoft.com/office/drawing/2010/main" w="9525">
                     <a:solidFill>
                       <a:srgbClr val="000000"/>
                     </a:solidFill>
@@ -11445,7 +11446,7 @@
               </a:ln>
               <a:extLst>
                 <a:ext uri="{91240B29-F687-4f45-9708-019B960494DF}">
-                  <a14:hiddenLine xmlns:a14="http://schemas.microsoft.com/office/drawing/2010/main" xmlns="" w="9525">
+                  <a14:hiddenLine xmlns="" xmlns:a14="http://schemas.microsoft.com/office/drawing/2010/main" w="9525">
                     <a:solidFill>
                       <a:srgbClr val="000000"/>
                     </a:solidFill>
@@ -11535,7 +11536,7 @@
               </a:ln>
               <a:extLst>
                 <a:ext uri="{91240B29-F687-4f45-9708-019B960494DF}">
-                  <a14:hiddenLine xmlns:a14="http://schemas.microsoft.com/office/drawing/2010/main" xmlns="" w="9525">
+                  <a14:hiddenLine xmlns="" xmlns:a14="http://schemas.microsoft.com/office/drawing/2010/main" w="9525">
                     <a:solidFill>
                       <a:srgbClr val="000000"/>
                     </a:solidFill>
@@ -11603,7 +11604,7 @@
               </a:ln>
               <a:extLst>
                 <a:ext uri="{91240B29-F687-4f45-9708-019B960494DF}">
-                  <a14:hiddenLine xmlns:a14="http://schemas.microsoft.com/office/drawing/2010/main" xmlns="" w="9525">
+                  <a14:hiddenLine xmlns="" xmlns:a14="http://schemas.microsoft.com/office/drawing/2010/main" w="9525">
                     <a:solidFill>
                       <a:srgbClr val="000000"/>
                     </a:solidFill>
@@ -11693,7 +11694,7 @@
               </a:ln>
               <a:extLst>
                 <a:ext uri="{91240B29-F687-4f45-9708-019B960494DF}">
-                  <a14:hiddenLine xmlns:a14="http://schemas.microsoft.com/office/drawing/2010/main" xmlns="" w="9525">
+                  <a14:hiddenLine xmlns="" xmlns:a14="http://schemas.microsoft.com/office/drawing/2010/main" w="9525">
                     <a:solidFill>
                       <a:srgbClr val="000000"/>
                     </a:solidFill>
@@ -11761,7 +11762,7 @@
               </a:ln>
               <a:extLst>
                 <a:ext uri="{91240B29-F687-4f45-9708-019B960494DF}">
-                  <a14:hiddenLine xmlns:a14="http://schemas.microsoft.com/office/drawing/2010/main" xmlns="" w="9525">
+                  <a14:hiddenLine xmlns="" xmlns:a14="http://schemas.microsoft.com/office/drawing/2010/main" w="9525">
                     <a:solidFill>
                       <a:srgbClr val="000000"/>
                     </a:solidFill>
@@ -11851,7 +11852,7 @@
               </a:ln>
               <a:extLst>
                 <a:ext uri="{91240B29-F687-4f45-9708-019B960494DF}">
-                  <a14:hiddenLine xmlns:a14="http://schemas.microsoft.com/office/drawing/2010/main" xmlns="" w="9525">
+                  <a14:hiddenLine xmlns="" xmlns:a14="http://schemas.microsoft.com/office/drawing/2010/main" w="9525">
                     <a:solidFill>
                       <a:srgbClr val="000000"/>
                     </a:solidFill>
@@ -11885,7 +11886,7 @@
               </a:ln>
               <a:extLst>
                 <a:ext uri="{91240B29-F687-4f45-9708-019B960494DF}">
-                  <a14:hiddenLine xmlns:a14="http://schemas.microsoft.com/office/drawing/2010/main" xmlns="" w="9525">
+                  <a14:hiddenLine xmlns="" xmlns:a14="http://schemas.microsoft.com/office/drawing/2010/main" w="9525">
                     <a:solidFill>
                       <a:srgbClr val="000000"/>
                     </a:solidFill>
@@ -12025,7 +12026,7 @@
           <a:p>
             <a:fld id="{968E067E-08D9-EE45-AE85-B5EB2135B1EF}" type="datetimeFigureOut">
               <a:rPr lang="en-US" smtClean="0"/>
-              <a:t>7/13/2018</a:t>
+              <a:t>7/14/2018</a:t>
             </a:fld>
             <a:endParaRPr lang="en-US"/>
           </a:p>
@@ -12718,6 +12719,91 @@
 </p:sld>
 </file>
 
+<file path=ppt/slides/slide11.xml><?xml version="1.0" encoding="utf-8"?>
+<p:sld xmlns:a="http://schemas.openxmlformats.org/drawingml/2006/main" xmlns:r="http://schemas.openxmlformats.org/officeDocument/2006/relationships" xmlns:p="http://schemas.openxmlformats.org/presentationml/2006/main">
+  <p:cSld>
+    <p:spTree>
+      <p:nvGrpSpPr>
+        <p:cNvPr id="1" name=""/>
+        <p:cNvGrpSpPr/>
+        <p:nvPr/>
+      </p:nvGrpSpPr>
+      <p:grpSpPr>
+        <a:xfrm>
+          <a:off x="0" y="0"/>
+          <a:ext cx="0" cy="0"/>
+          <a:chOff x="0" y="0"/>
+          <a:chExt cx="0" cy="0"/>
+        </a:xfrm>
+      </p:grpSpPr>
+      <p:sp>
+        <p:nvSpPr>
+          <p:cNvPr id="2" name="Title 1"/>
+          <p:cNvSpPr>
+            <a:spLocks noGrp="1"/>
+          </p:cNvSpPr>
+          <p:nvPr>
+            <p:ph type="title"/>
+          </p:nvPr>
+        </p:nvSpPr>
+        <p:spPr/>
+        <p:txBody>
+          <a:bodyPr/>
+          <a:lstStyle/>
+          <a:p>
+            <a:r>
+              <a:rPr lang="en-US" dirty="0"/>
+              <a:t>Pre optimization results (for comparison)</a:t>
+            </a:r>
+          </a:p>
+        </p:txBody>
+      </p:sp>
+      <p:pic>
+        <p:nvPicPr>
+          <p:cNvPr id="4" name="Picture 3"/>
+          <p:cNvPicPr/>
+          <p:nvPr/>
+        </p:nvPicPr>
+        <p:blipFill>
+          <a:blip r:embed="rId2">
+            <a:extLst>
+              <a:ext uri="{28A0092B-C50C-407E-A947-70E740481C1C}">
+                <a14:useLocalDpi xmlns:a14="http://schemas.microsoft.com/office/drawing/2010/main" val="0"/>
+              </a:ext>
+            </a:extLst>
+          </a:blip>
+          <a:srcRect/>
+          <a:stretch>
+            <a:fillRect/>
+          </a:stretch>
+        </p:blipFill>
+        <p:spPr bwMode="auto">
+          <a:xfrm>
+            <a:off x="1714500" y="2097088"/>
+            <a:ext cx="6997700" cy="4178300"/>
+          </a:xfrm>
+          <a:prstGeom prst="rect">
+            <a:avLst/>
+          </a:prstGeom>
+          <a:noFill/>
+          <a:ln>
+            <a:noFill/>
+          </a:ln>
+        </p:spPr>
+      </p:pic>
+    </p:spTree>
+    <p:extLst>
+      <p:ext uri="{BB962C8B-B14F-4D97-AF65-F5344CB8AC3E}">
+        <p14:creationId xmlns:p14="http://schemas.microsoft.com/office/powerpoint/2010/main" val="2310189847"/>
+      </p:ext>
+    </p:extLst>
+  </p:cSld>
+  <p:clrMapOvr>
+    <a:masterClrMapping/>
+  </p:clrMapOvr>
+</p:sld>
+</file>
+
 <file path=ppt/slides/slide2.xml><?xml version="1.0" encoding="utf-8"?>
 <p:sld xmlns:a="http://schemas.openxmlformats.org/drawingml/2006/main" xmlns:r="http://schemas.openxmlformats.org/officeDocument/2006/relationships" xmlns:p="http://schemas.openxmlformats.org/presentationml/2006/main">
   <p:cSld>

</xml_diff>